<commit_message>
lab6 & Lecture 13 & 14
</commit_message>
<xml_diff>
--- a/Lectures/cse220-11-functions.pptx
+++ b/Lectures/cse220-11-functions.pptx
@@ -8,9 +8,9 @@
     <p:notesMasterId r:id="rId43"/>
   </p:notesMasterIdLst>
   <p:sldIdLst>
-    <p:sldId id="470" r:id="rId2"/>
-    <p:sldId id="511" r:id="rId3"/>
-    <p:sldId id="512" r:id="rId4"/>
+    <p:sldId id="511" r:id="rId2"/>
+    <p:sldId id="512" r:id="rId3"/>
+    <p:sldId id="470" r:id="rId4"/>
     <p:sldId id="471" r:id="rId5"/>
     <p:sldId id="472" r:id="rId6"/>
     <p:sldId id="473" r:id="rId7"/>
@@ -4001,12 +4001,18 @@
       </p:grpSpPr>
       <p:sp>
         <p:nvSpPr>
-          <p:cNvPr id="2" name="Title 1"/>
+          <p:cNvPr id="2" name="Title 1">
+            <a:extLst>
+              <a:ext uri="{FF2B5EF4-FFF2-40B4-BE49-F238E27FC236}">
+                <a16:creationId xmlns:a16="http://schemas.microsoft.com/office/drawing/2014/main" id="{2680FC77-9BD4-A843-8443-0485E673883C}"/>
+              </a:ext>
+            </a:extLst>
+          </p:cNvPr>
           <p:cNvSpPr>
             <a:spLocks noGrp="1"/>
           </p:cNvSpPr>
           <p:nvPr>
-            <p:ph type="ctrTitle"/>
+            <p:ph type="title"/>
           </p:nvPr>
         </p:nvSpPr>
         <p:spPr/>
@@ -4015,20 +4021,26 @@
           <a:lstStyle/>
           <a:p>
             <a:r>
-              <a:rPr lang="en-US" dirty="0"/>
-              <a:t>CSE 220 – C Programming</a:t>
-            </a:r>
-          </a:p>
-        </p:txBody>
-      </p:sp>
-      <p:sp>
-        <p:nvSpPr>
-          <p:cNvPr id="3" name="Subtitle 2"/>
+              <a:rPr lang="en-CN" dirty="0"/>
+              <a:t>Exam</a:t>
+            </a:r>
+          </a:p>
+        </p:txBody>
+      </p:sp>
+      <p:sp>
+        <p:nvSpPr>
+          <p:cNvPr id="3" name="Content Placeholder 2">
+            <a:extLst>
+              <a:ext uri="{FF2B5EF4-FFF2-40B4-BE49-F238E27FC236}">
+                <a16:creationId xmlns:a16="http://schemas.microsoft.com/office/drawing/2014/main" id="{F85CE561-624D-8642-8C80-421E1954ADDF}"/>
+              </a:ext>
+            </a:extLst>
+          </p:cNvPr>
           <p:cNvSpPr>
             <a:spLocks noGrp="1"/>
           </p:cNvSpPr>
           <p:nvPr>
-            <p:ph type="subTitle" idx="1"/>
+            <p:ph idx="1"/>
           </p:nvPr>
         </p:nvSpPr>
         <p:spPr/>
@@ -4037,20 +4049,69 @@
           <a:lstStyle/>
           <a:p>
             <a:r>
-              <a:rPr lang="en-US" dirty="0">
-                <a:solidFill>
-                  <a:schemeClr val="tx1"/>
-                </a:solidFill>
-              </a:rPr>
-              <a:t>Functions</a:t>
-            </a:r>
+              <a:rPr lang="en-CN" dirty="0"/>
+              <a:t>Nov 11 (Wednesday), 50 minutes</a:t>
+            </a:r>
+          </a:p>
+          <a:p>
+            <a:r>
+              <a:rPr lang="en-CN" dirty="0"/>
+              <a:t>Mimir, similar with an assignment, but no visible test cases</a:t>
+            </a:r>
+          </a:p>
+          <a:p>
+            <a:r>
+              <a:rPr lang="en-CN" dirty="0"/>
+              <a:t>Screen share and keep camera open</a:t>
+            </a:r>
+          </a:p>
+          <a:p>
+            <a:r>
+              <a:rPr lang="en-CN" dirty="0"/>
+              <a:t>Release the exam samples on Friday this week</a:t>
+            </a:r>
+            <a:r>
+              <a:rPr lang="en-US" dirty="0"/>
+              <a:t>, review them on the lectures before exam.</a:t>
+            </a:r>
+            <a:endParaRPr lang="en-CN" dirty="0"/>
+          </a:p>
+        </p:txBody>
+      </p:sp>
+      <p:sp>
+        <p:nvSpPr>
+          <p:cNvPr id="4" name="Slide Number Placeholder 3">
+            <a:extLst>
+              <a:ext uri="{FF2B5EF4-FFF2-40B4-BE49-F238E27FC236}">
+                <a16:creationId xmlns:a16="http://schemas.microsoft.com/office/drawing/2014/main" id="{A367E978-F7B3-E944-AEAA-08FC4551F7E9}"/>
+              </a:ext>
+            </a:extLst>
+          </p:cNvPr>
+          <p:cNvSpPr>
+            <a:spLocks noGrp="1"/>
+          </p:cNvSpPr>
+          <p:nvPr>
+            <p:ph type="sldNum" sz="quarter" idx="12"/>
+          </p:nvPr>
+        </p:nvSpPr>
+        <p:spPr/>
+        <p:txBody>
+          <a:bodyPr/>
+          <a:lstStyle/>
+          <a:p>
+            <a:fld id="{B6F15528-21DE-4FAA-801E-634DDDAF4B2B}" type="slidenum">
+              <a:rPr lang="en-US" smtClean="0"/>
+              <a:pPr/>
+              <a:t>1</a:t>
+            </a:fld>
+            <a:endParaRPr lang="en-US" dirty="0"/>
           </a:p>
         </p:txBody>
       </p:sp>
     </p:spTree>
     <p:extLst>
       <p:ext uri="{BB962C8B-B14F-4D97-AF65-F5344CB8AC3E}">
-        <p14:creationId xmlns:p14="http://schemas.microsoft.com/office/powerpoint/2010/main" val="621296807"/>
+        <p14:creationId xmlns:p14="http://schemas.microsoft.com/office/powerpoint/2010/main" val="4127374694"/>
       </p:ext>
     </p:extLst>
   </p:cSld>
@@ -6456,33 +6517,6 @@
       </p:grpSpPr>
       <p:sp>
         <p:nvSpPr>
-          <p:cNvPr id="2" name="Title 1"/>
-          <p:cNvSpPr>
-            <a:spLocks noGrp="1"/>
-          </p:cNvSpPr>
-          <p:nvPr>
-            <p:ph type="title"/>
-          </p:nvPr>
-        </p:nvSpPr>
-        <p:spPr>
-          <a:xfrm>
-            <a:off x="838200" y="-662781"/>
-            <a:ext cx="7269480" cy="1325562"/>
-          </a:xfrm>
-        </p:spPr>
-        <p:txBody>
-          <a:bodyPr/>
-          <a:lstStyle/>
-          <a:p>
-            <a:r>
-              <a:rPr lang="en-US" dirty="0"/>
-              <a:t>Example</a:t>
-            </a:r>
-          </a:p>
-        </p:txBody>
-      </p:sp>
-      <p:sp>
-        <p:nvSpPr>
           <p:cNvPr id="3" name="Content Placeholder 2"/>
           <p:cNvSpPr>
             <a:spLocks noGrp="1"/>
@@ -6874,6 +6908,33 @@
       </p:sp>
       <p:sp>
         <p:nvSpPr>
+          <p:cNvPr id="2" name="Title 1"/>
+          <p:cNvSpPr>
+            <a:spLocks noGrp="1"/>
+          </p:cNvSpPr>
+          <p:nvPr>
+            <p:ph type="title"/>
+          </p:nvPr>
+        </p:nvSpPr>
+        <p:spPr>
+          <a:xfrm>
+            <a:off x="838200" y="-662781"/>
+            <a:ext cx="7269480" cy="1325562"/>
+          </a:xfrm>
+        </p:spPr>
+        <p:txBody>
+          <a:bodyPr/>
+          <a:lstStyle/>
+          <a:p>
+            <a:r>
+              <a:rPr lang="en-US" dirty="0"/>
+              <a:t>Example</a:t>
+            </a:r>
+          </a:p>
+        </p:txBody>
+      </p:sp>
+      <p:sp>
+        <p:nvSpPr>
           <p:cNvPr id="12" name="Slide Number Placeholder 11"/>
           <p:cNvSpPr>
             <a:spLocks noGrp="1"/>
@@ -6893,6 +6954,67 @@
               <a:t>16</a:t>
             </a:fld>
             <a:endParaRPr lang="en-US" dirty="0"/>
+          </a:p>
+        </p:txBody>
+      </p:sp>
+      <p:sp>
+        <p:nvSpPr>
+          <p:cNvPr id="4" name="Rectangular Callout 3">
+            <a:extLst>
+              <a:ext uri="{FF2B5EF4-FFF2-40B4-BE49-F238E27FC236}">
+                <a16:creationId xmlns:a16="http://schemas.microsoft.com/office/drawing/2014/main" id="{724C8BA7-52B8-1E4C-912C-F314EFA5AFC6}"/>
+              </a:ext>
+            </a:extLst>
+          </p:cNvPr>
+          <p:cNvSpPr/>
+          <p:nvPr/>
+        </p:nvSpPr>
+        <p:spPr>
+          <a:xfrm>
+            <a:off x="3443538" y="1752600"/>
+            <a:ext cx="4953918" cy="612648"/>
+          </a:xfrm>
+          <a:prstGeom prst="wedgeRectCallout">
+            <a:avLst>
+              <a:gd name="adj1" fmla="val -32988"/>
+              <a:gd name="adj2" fmla="val -70372"/>
+            </a:avLst>
+          </a:prstGeom>
+          <a:noFill/>
+        </p:spPr>
+        <p:style>
+          <a:lnRef idx="2">
+            <a:schemeClr val="accent1">
+              <a:shade val="50000"/>
+            </a:schemeClr>
+          </a:lnRef>
+          <a:fillRef idx="1">
+            <a:schemeClr val="accent1"/>
+          </a:fillRef>
+          <a:effectRef idx="0">
+            <a:schemeClr val="accent1"/>
+          </a:effectRef>
+          <a:fontRef idx="minor">
+            <a:schemeClr val="lt1"/>
+          </a:fontRef>
+        </p:style>
+        <p:txBody>
+          <a:bodyPr rtlCol="0" anchor="ctr"/>
+          <a:lstStyle/>
+          <a:p>
+            <a:pPr algn="ctr"/>
+            <a:r>
+              <a:rPr lang="en-US" dirty="0">
+                <a:solidFill>
+                  <a:srgbClr val="FF0000"/>
+                </a:solidFill>
+                <a:latin typeface="Consolas" charset="0"/>
+                <a:ea typeface="Consolas" charset="0"/>
+                <a:cs typeface="Consolas" charset="0"/>
+              </a:rPr>
+              <a:t>double percentage (double, double);</a:t>
+            </a:r>
+            <a:endParaRPr lang="en-CN" dirty="0"/>
           </a:p>
         </p:txBody>
       </p:sp>
@@ -6906,6 +7028,84 @@
   <p:clrMapOvr>
     <a:masterClrMapping/>
   </p:clrMapOvr>
+  <p:timing>
+    <p:tnLst>
+      <p:par>
+        <p:cTn id="1" dur="indefinite" restart="never" nodeType="tmRoot">
+          <p:childTnLst>
+            <p:seq concurrent="1" nextAc="seek">
+              <p:cTn id="2" dur="indefinite" nodeType="mainSeq">
+                <p:childTnLst>
+                  <p:par>
+                    <p:cTn id="3" fill="hold">
+                      <p:stCondLst>
+                        <p:cond delay="indefinite"/>
+                      </p:stCondLst>
+                      <p:childTnLst>
+                        <p:par>
+                          <p:cTn id="4" fill="hold">
+                            <p:stCondLst>
+                              <p:cond delay="0"/>
+                            </p:stCondLst>
+                            <p:childTnLst>
+                              <p:par>
+                                <p:cTn id="5" presetID="1" presetClass="entr" presetSubtype="0" fill="hold" grpId="0" nodeType="clickEffect">
+                                  <p:stCondLst>
+                                    <p:cond delay="0"/>
+                                  </p:stCondLst>
+                                  <p:childTnLst>
+                                    <p:set>
+                                      <p:cBhvr>
+                                        <p:cTn id="6" dur="1" fill="hold">
+                                          <p:stCondLst>
+                                            <p:cond delay="0"/>
+                                          </p:stCondLst>
+                                        </p:cTn>
+                                        <p:tgtEl>
+                                          <p:spTgt spid="4"/>
+                                        </p:tgtEl>
+                                        <p:attrNameLst>
+                                          <p:attrName>style.visibility</p:attrName>
+                                        </p:attrNameLst>
+                                      </p:cBhvr>
+                                      <p:to>
+                                        <p:strVal val="visible"/>
+                                      </p:to>
+                                    </p:set>
+                                  </p:childTnLst>
+                                </p:cTn>
+                              </p:par>
+                            </p:childTnLst>
+                          </p:cTn>
+                        </p:par>
+                      </p:childTnLst>
+                    </p:cTn>
+                  </p:par>
+                </p:childTnLst>
+              </p:cTn>
+              <p:prevCondLst>
+                <p:cond evt="onPrev" delay="0">
+                  <p:tgtEl>
+                    <p:sldTgt/>
+                  </p:tgtEl>
+                </p:cond>
+              </p:prevCondLst>
+              <p:nextCondLst>
+                <p:cond evt="onNext" delay="0">
+                  <p:tgtEl>
+                    <p:sldTgt/>
+                  </p:tgtEl>
+                </p:cond>
+              </p:nextCondLst>
+            </p:seq>
+          </p:childTnLst>
+        </p:cTn>
+      </p:par>
+    </p:tnLst>
+    <p:bldLst>
+      <p:bldP spid="4" grpId="0" animBg="1"/>
+    </p:bldLst>
+  </p:timing>
 </p:sld>
 </file>
 
@@ -8199,7 +8399,7 @@
           <p:cNvPr id="2" name="Title 1">
             <a:extLst>
               <a:ext uri="{FF2B5EF4-FFF2-40B4-BE49-F238E27FC236}">
-                <a16:creationId xmlns:a16="http://schemas.microsoft.com/office/drawing/2014/main" id="{2680FC77-9BD4-A843-8443-0485E673883C}"/>
+                <a16:creationId xmlns:a16="http://schemas.microsoft.com/office/drawing/2014/main" id="{B84511CA-9E4E-AD4B-8436-FD074650AA86}"/>
               </a:ext>
             </a:extLst>
           </p:cNvPr>
@@ -8217,7 +8417,7 @@
           <a:p>
             <a:r>
               <a:rPr lang="en-CN" dirty="0"/>
-              <a:t>Exam</a:t>
+              <a:t>Mid-semester Evaluation</a:t>
             </a:r>
           </a:p>
         </p:txBody>
@@ -8227,7 +8427,7 @@
           <p:cNvPr id="3" name="Content Placeholder 2">
             <a:extLst>
               <a:ext uri="{FF2B5EF4-FFF2-40B4-BE49-F238E27FC236}">
-                <a16:creationId xmlns:a16="http://schemas.microsoft.com/office/drawing/2014/main" id="{F85CE561-624D-8642-8C80-421E1954ADDF}"/>
+                <a16:creationId xmlns:a16="http://schemas.microsoft.com/office/drawing/2014/main" id="{5C5A1E57-9338-454B-A710-F2C718CACAA1}"/>
               </a:ext>
             </a:extLst>
           </p:cNvPr>
@@ -8245,29 +8445,16 @@
           <a:p>
             <a:r>
               <a:rPr lang="en-CN" dirty="0"/>
-              <a:t>11 Nov, 50 minutes</a:t>
-            </a:r>
-          </a:p>
-          <a:p>
-            <a:r>
-              <a:rPr lang="en-CN" dirty="0"/>
-              <a:t>Mimir, similar with an assignment, but no visible test cases</a:t>
-            </a:r>
-          </a:p>
-          <a:p>
-            <a:r>
-              <a:rPr lang="en-CN" dirty="0"/>
-              <a:t>Screen share and keep camera open</a:t>
-            </a:r>
-          </a:p>
-          <a:p>
-            <a:r>
-              <a:rPr lang="en-CN" dirty="0"/>
-              <a:t>Release the exam samples on Friday this week</a:t>
-            </a:r>
-            <a:r>
-              <a:rPr lang="en-US" dirty="0"/>
-              <a:t>, review them on 9 Nov.</a:t>
+              <a:t>Comments and Suggestions</a:t>
+            </a:r>
+          </a:p>
+          <a:p>
+            <a:pPr lvl="1"/>
+            <a:r>
+              <a:rPr lang="en-US" dirty="0">
+                <a:hlinkClick r:id="rId2" tooltip="https://www.egr.msu.edu/mid-semester-evaluation"/>
+              </a:rPr>
+              <a:t>https://www.egr.msu.edu/mid-semester-evaluation</a:t>
             </a:r>
             <a:endParaRPr lang="en-CN" dirty="0"/>
           </a:p>
@@ -8278,7 +8465,7 @@
           <p:cNvPr id="4" name="Slide Number Placeholder 3">
             <a:extLst>
               <a:ext uri="{FF2B5EF4-FFF2-40B4-BE49-F238E27FC236}">
-                <a16:creationId xmlns:a16="http://schemas.microsoft.com/office/drawing/2014/main" id="{A367E978-F7B3-E944-AEAA-08FC4551F7E9}"/>
+                <a16:creationId xmlns:a16="http://schemas.microsoft.com/office/drawing/2014/main" id="{2A39E335-264B-9A48-997B-4098667C4963}"/>
               </a:ext>
             </a:extLst>
           </p:cNvPr>
@@ -8306,7 +8493,7 @@
     </p:spTree>
     <p:extLst>
       <p:ext uri="{BB962C8B-B14F-4D97-AF65-F5344CB8AC3E}">
-        <p14:creationId xmlns:p14="http://schemas.microsoft.com/office/powerpoint/2010/main" val="4127374694"/>
+        <p14:creationId xmlns:p14="http://schemas.microsoft.com/office/powerpoint/2010/main" val="4250908977"/>
       </p:ext>
     </p:extLst>
   </p:cSld>
@@ -13967,18 +14154,12 @@
       </p:grpSpPr>
       <p:sp>
         <p:nvSpPr>
-          <p:cNvPr id="2" name="Title 1">
-            <a:extLst>
-              <a:ext uri="{FF2B5EF4-FFF2-40B4-BE49-F238E27FC236}">
-                <a16:creationId xmlns:a16="http://schemas.microsoft.com/office/drawing/2014/main" id="{B84511CA-9E4E-AD4B-8436-FD074650AA86}"/>
-              </a:ext>
-            </a:extLst>
-          </p:cNvPr>
+          <p:cNvPr id="2" name="Title 1"/>
           <p:cNvSpPr>
             <a:spLocks noGrp="1"/>
           </p:cNvSpPr>
           <p:nvPr>
-            <p:ph type="title"/>
+            <p:ph type="ctrTitle"/>
           </p:nvPr>
         </p:nvSpPr>
         <p:spPr/>
@@ -13987,26 +14168,20 @@
           <a:lstStyle/>
           <a:p>
             <a:r>
-              <a:rPr lang="en-CN" dirty="0"/>
-              <a:t>Mid-semester Evaluation</a:t>
-            </a:r>
-          </a:p>
-        </p:txBody>
-      </p:sp>
-      <p:sp>
-        <p:nvSpPr>
-          <p:cNvPr id="3" name="Content Placeholder 2">
-            <a:extLst>
-              <a:ext uri="{FF2B5EF4-FFF2-40B4-BE49-F238E27FC236}">
-                <a16:creationId xmlns:a16="http://schemas.microsoft.com/office/drawing/2014/main" id="{5C5A1E57-9338-454B-A710-F2C718CACAA1}"/>
-              </a:ext>
-            </a:extLst>
-          </p:cNvPr>
+              <a:rPr lang="en-US" dirty="0"/>
+              <a:t>CSE 220 – C Programming</a:t>
+            </a:r>
+          </a:p>
+        </p:txBody>
+      </p:sp>
+      <p:sp>
+        <p:nvSpPr>
+          <p:cNvPr id="3" name="Subtitle 2"/>
           <p:cNvSpPr>
             <a:spLocks noGrp="1"/>
           </p:cNvSpPr>
           <p:nvPr>
-            <p:ph idx="1"/>
+            <p:ph type="subTitle" idx="1"/>
           </p:nvPr>
         </p:nvSpPr>
         <p:spPr/>
@@ -14015,56 +14190,20 @@
           <a:lstStyle/>
           <a:p>
             <a:r>
-              <a:rPr lang="en-CN" dirty="0"/>
-              <a:t>Comments and Suggestions</a:t>
-            </a:r>
-          </a:p>
-          <a:p>
-            <a:pPr lvl="1"/>
-            <a:r>
               <a:rPr lang="en-US" dirty="0">
-                <a:hlinkClick r:id="rId2" tooltip="https://www.egr.msu.edu/mid-semester-evaluation"/>
-              </a:rPr>
-              <a:t>https://www.egr.msu.edu/mid-semester-evaluation</a:t>
-            </a:r>
-            <a:endParaRPr lang="en-CN" dirty="0"/>
-          </a:p>
-        </p:txBody>
-      </p:sp>
-      <p:sp>
-        <p:nvSpPr>
-          <p:cNvPr id="4" name="Slide Number Placeholder 3">
-            <a:extLst>
-              <a:ext uri="{FF2B5EF4-FFF2-40B4-BE49-F238E27FC236}">
-                <a16:creationId xmlns:a16="http://schemas.microsoft.com/office/drawing/2014/main" id="{2A39E335-264B-9A48-997B-4098667C4963}"/>
-              </a:ext>
-            </a:extLst>
-          </p:cNvPr>
-          <p:cNvSpPr>
-            <a:spLocks noGrp="1"/>
-          </p:cNvSpPr>
-          <p:nvPr>
-            <p:ph type="sldNum" sz="quarter" idx="12"/>
-          </p:nvPr>
-        </p:nvSpPr>
-        <p:spPr/>
-        <p:txBody>
-          <a:bodyPr/>
-          <a:lstStyle/>
-          <a:p>
-            <a:fld id="{B6F15528-21DE-4FAA-801E-634DDDAF4B2B}" type="slidenum">
-              <a:rPr lang="en-US" smtClean="0"/>
-              <a:pPr/>
-              <a:t>3</a:t>
-            </a:fld>
-            <a:endParaRPr lang="en-US" dirty="0"/>
+                <a:solidFill>
+                  <a:schemeClr val="tx1"/>
+                </a:solidFill>
+              </a:rPr>
+              <a:t>Functions</a:t>
+            </a:r>
           </a:p>
         </p:txBody>
       </p:sp>
     </p:spTree>
     <p:extLst>
       <p:ext uri="{BB962C8B-B14F-4D97-AF65-F5344CB8AC3E}">
-        <p14:creationId xmlns:p14="http://schemas.microsoft.com/office/powerpoint/2010/main" val="4250908977"/>
+        <p14:creationId xmlns:p14="http://schemas.microsoft.com/office/powerpoint/2010/main" val="621296807"/>
       </p:ext>
     </p:extLst>
   </p:cSld>

</xml_diff>